<commit_message>
Updated presentation and roadmap
</commit_message>
<xml_diff>
--- a/Presentations/SysManage.pptx
+++ b/Presentations/SysManage.pptx
@@ -16519,8 +16519,8 @@
         </p:nvSpPr>
         <p:spPr>
           <a:xfrm>
-            <a:off x="365760" y="2468880"/>
-            <a:ext cx="1719072" cy="1508760"/>
+            <a:off x="274320" y="2468880"/>
+            <a:ext cx="1508760" cy="1417320"/>
           </a:xfrm>
           <a:prstGeom prst="roundRect">
             <a:avLst/>
@@ -16559,7 +16559,7 @@
               </a:spcAft>
             </a:pPr>
             <a:r>
-              <a:rPr sz="900" b="0">
+              <a:rPr sz="800" b="0">
                 <a:solidFill>
                   <a:srgbClr val="FFFFFF"/>
                 </a:solidFill>
@@ -16578,7 +16578,7 @@
               </a:spcAft>
             </a:pPr>
             <a:r>
-              <a:rPr sz="900" b="0">
+              <a:rPr sz="800" b="0">
                 <a:solidFill>
                   <a:srgbClr val="FFFFFF"/>
                 </a:solidFill>
@@ -16597,7 +16597,7 @@
               </a:spcAft>
             </a:pPr>
             <a:r>
-              <a:rPr sz="900" b="0">
+              <a:rPr sz="800" b="0">
                 <a:solidFill>
                   <a:srgbClr val="FFFFFF"/>
                 </a:solidFill>
@@ -16616,7 +16616,7 @@
               </a:spcAft>
             </a:pPr>
             <a:r>
-              <a:rPr sz="900" b="0">
+              <a:rPr sz="800" b="0">
                 <a:solidFill>
                   <a:srgbClr val="FFFFFF"/>
                 </a:solidFill>
@@ -16635,7 +16635,7 @@
               </a:spcAft>
             </a:pPr>
             <a:r>
-              <a:rPr sz="900" b="0">
+              <a:rPr sz="800" b="0">
                 <a:solidFill>
                   <a:srgbClr val="FFFFFF"/>
                 </a:solidFill>
@@ -16654,8 +16654,8 @@
         </p:nvSpPr>
         <p:spPr>
           <a:xfrm>
-            <a:off x="2267712" y="2468880"/>
-            <a:ext cx="1719072" cy="1508760"/>
+            <a:off x="1938528" y="2468880"/>
+            <a:ext cx="1508760" cy="1417320"/>
           </a:xfrm>
           <a:prstGeom prst="roundRect">
             <a:avLst/>
@@ -16694,7 +16694,7 @@
               </a:spcAft>
             </a:pPr>
             <a:r>
-              <a:rPr sz="900" b="0">
+              <a:rPr sz="800" b="0">
                 <a:solidFill>
                   <a:srgbClr val="FFFFFF"/>
                 </a:solidFill>
@@ -16713,7 +16713,7 @@
               </a:spcAft>
             </a:pPr>
             <a:r>
-              <a:rPr sz="900" b="0">
+              <a:rPr sz="800" b="0">
                 <a:solidFill>
                   <a:srgbClr val="FFFFFF"/>
                 </a:solidFill>
@@ -16732,7 +16732,7 @@
               </a:spcAft>
             </a:pPr>
             <a:r>
-              <a:rPr sz="900" b="0">
+              <a:rPr sz="800" b="0">
                 <a:solidFill>
                   <a:srgbClr val="FFFFFF"/>
                 </a:solidFill>
@@ -16751,7 +16751,7 @@
               </a:spcAft>
             </a:pPr>
             <a:r>
-              <a:rPr sz="900" b="0">
+              <a:rPr sz="800" b="0">
                 <a:solidFill>
                   <a:srgbClr val="FFFFFF"/>
                 </a:solidFill>
@@ -16770,7 +16770,7 @@
               </a:spcAft>
             </a:pPr>
             <a:r>
-              <a:rPr sz="900" b="0">
+              <a:rPr sz="800" b="0">
                 <a:solidFill>
                   <a:srgbClr val="FFFFFF"/>
                 </a:solidFill>
@@ -16789,8 +16789,8 @@
         </p:nvSpPr>
         <p:spPr>
           <a:xfrm>
-            <a:off x="4169664" y="2468880"/>
-            <a:ext cx="1719072" cy="1508760"/>
+            <a:off x="3602736" y="2468880"/>
+            <a:ext cx="1508760" cy="1417320"/>
           </a:xfrm>
           <a:prstGeom prst="roundRect">
             <a:avLst/>
@@ -16829,7 +16829,7 @@
               </a:spcAft>
             </a:pPr>
             <a:r>
-              <a:rPr sz="900" b="0">
+              <a:rPr sz="800" b="0">
                 <a:solidFill>
                   <a:srgbClr val="FFFFFF"/>
                 </a:solidFill>
@@ -16848,7 +16848,7 @@
               </a:spcAft>
             </a:pPr>
             <a:r>
-              <a:rPr sz="900" b="0">
+              <a:rPr sz="800" b="0">
                 <a:solidFill>
                   <a:srgbClr val="FFFFFF"/>
                 </a:solidFill>
@@ -16867,7 +16867,7 @@
               </a:spcAft>
             </a:pPr>
             <a:r>
-              <a:rPr sz="900" b="0">
+              <a:rPr sz="800" b="0">
                 <a:solidFill>
                   <a:srgbClr val="FFFFFF"/>
                 </a:solidFill>
@@ -16886,7 +16886,7 @@
               </a:spcAft>
             </a:pPr>
             <a:r>
-              <a:rPr sz="900" b="0">
+              <a:rPr sz="800" b="0">
                 <a:solidFill>
                   <a:srgbClr val="FFFFFF"/>
                 </a:solidFill>
@@ -16905,7 +16905,7 @@
               </a:spcAft>
             </a:pPr>
             <a:r>
-              <a:rPr sz="900" b="0">
+              <a:rPr sz="800" b="0">
                 <a:solidFill>
                   <a:srgbClr val="FFFFFF"/>
                 </a:solidFill>
@@ -16924,8 +16924,8 @@
         </p:nvSpPr>
         <p:spPr>
           <a:xfrm>
-            <a:off x="6071616" y="2468880"/>
-            <a:ext cx="1719072" cy="1508760"/>
+            <a:off x="5266944" y="2468880"/>
+            <a:ext cx="1508760" cy="1417320"/>
           </a:xfrm>
           <a:prstGeom prst="roundRect">
             <a:avLst/>
@@ -16964,7 +16964,7 @@
               </a:spcAft>
             </a:pPr>
             <a:r>
-              <a:rPr sz="900" b="0">
+              <a:rPr sz="800" b="0">
                 <a:solidFill>
                   <a:srgbClr val="FFFFFF"/>
                 </a:solidFill>
@@ -16983,7 +16983,7 @@
               </a:spcAft>
             </a:pPr>
             <a:r>
-              <a:rPr sz="900" b="0">
+              <a:rPr sz="800" b="0">
                 <a:solidFill>
                   <a:srgbClr val="FFFFFF"/>
                 </a:solidFill>
@@ -17002,7 +17002,7 @@
               </a:spcAft>
             </a:pPr>
             <a:r>
-              <a:rPr sz="900" b="0">
+              <a:rPr sz="800" b="0">
                 <a:solidFill>
                   <a:srgbClr val="FFFFFF"/>
                 </a:solidFill>
@@ -17021,7 +17021,7 @@
               </a:spcAft>
             </a:pPr>
             <a:r>
-              <a:rPr sz="900" b="0">
+              <a:rPr sz="800" b="0">
                 <a:solidFill>
                   <a:srgbClr val="FFFFFF"/>
                 </a:solidFill>
@@ -17040,7 +17040,7 @@
               </a:spcAft>
             </a:pPr>
             <a:r>
-              <a:rPr sz="900" b="0">
+              <a:rPr sz="800" b="0">
                 <a:solidFill>
                   <a:srgbClr val="FFFFFF"/>
                 </a:solidFill>
@@ -17059,8 +17059,8 @@
         </p:nvSpPr>
         <p:spPr>
           <a:xfrm>
-            <a:off x="7973568" y="2468880"/>
-            <a:ext cx="1719072" cy="1508760"/>
+            <a:off x="6931152" y="2468880"/>
+            <a:ext cx="1508760" cy="1417320"/>
           </a:xfrm>
           <a:prstGeom prst="roundRect">
             <a:avLst/>
@@ -17099,7 +17099,7 @@
               </a:spcAft>
             </a:pPr>
             <a:r>
-              <a:rPr sz="900" b="0">
+              <a:rPr sz="800" b="0">
                 <a:solidFill>
                   <a:srgbClr val="FFFFFF"/>
                 </a:solidFill>
@@ -17118,7 +17118,7 @@
               </a:spcAft>
             </a:pPr>
             <a:r>
-              <a:rPr sz="900" b="0">
+              <a:rPr sz="800" b="0">
                 <a:solidFill>
                   <a:srgbClr val="FFFFFF"/>
                 </a:solidFill>
@@ -17137,7 +17137,7 @@
               </a:spcAft>
             </a:pPr>
             <a:r>
-              <a:rPr sz="900" b="0">
+              <a:rPr sz="800" b="0">
                 <a:solidFill>
                   <a:srgbClr val="FFFFFF"/>
                 </a:solidFill>
@@ -17156,7 +17156,7 @@
               </a:spcAft>
             </a:pPr>
             <a:r>
-              <a:rPr sz="900" b="0">
+              <a:rPr sz="800" b="0">
                 <a:solidFill>
                   <a:srgbClr val="FFFFFF"/>
                 </a:solidFill>
@@ -17175,7 +17175,7 @@
               </a:spcAft>
             </a:pPr>
             <a:r>
-              <a:rPr sz="900" b="0">
+              <a:rPr sz="800" b="0">
                 <a:solidFill>
                   <a:srgbClr val="FFFFFF"/>
                 </a:solidFill>
@@ -17194,8 +17194,8 @@
         </p:nvSpPr>
         <p:spPr>
           <a:xfrm>
-            <a:off x="9875520" y="2468880"/>
-            <a:ext cx="1719072" cy="1508760"/>
+            <a:off x="8595360" y="2468880"/>
+            <a:ext cx="1508760" cy="1417320"/>
           </a:xfrm>
           <a:prstGeom prst="roundRect">
             <a:avLst/>
@@ -17234,7 +17234,7 @@
               </a:spcAft>
             </a:pPr>
             <a:r>
-              <a:rPr sz="900" b="0">
+              <a:rPr sz="800" b="0">
                 <a:solidFill>
                   <a:srgbClr val="FFFFFF"/>
                 </a:solidFill>
@@ -17253,7 +17253,7 @@
               </a:spcAft>
             </a:pPr>
             <a:r>
-              <a:rPr sz="900" b="0">
+              <a:rPr sz="800" b="0">
                 <a:solidFill>
                   <a:srgbClr val="FFFFFF"/>
                 </a:solidFill>
@@ -17272,7 +17272,7 @@
               </a:spcAft>
             </a:pPr>
             <a:r>
-              <a:rPr sz="900" b="0">
+              <a:rPr sz="800" b="0">
                 <a:solidFill>
                   <a:srgbClr val="FFFFFF"/>
                 </a:solidFill>
@@ -17291,7 +17291,7 @@
               </a:spcAft>
             </a:pPr>
             <a:r>
-              <a:rPr sz="900" b="0">
+              <a:rPr sz="800" b="0">
                 <a:solidFill>
                   <a:srgbClr val="FFFFFF"/>
                 </a:solidFill>
@@ -17310,7 +17310,7 @@
               </a:spcAft>
             </a:pPr>
             <a:r>
-              <a:rPr sz="900" b="0">
+              <a:rPr sz="800" b="0">
                 <a:solidFill>
                   <a:srgbClr val="FFFFFF"/>
                 </a:solidFill>
@@ -17329,8 +17329,8 @@
         </p:nvSpPr>
         <p:spPr>
           <a:xfrm>
-            <a:off x="365760" y="4251960"/>
-            <a:ext cx="1719072" cy="1508760"/>
+            <a:off x="10259568" y="2468880"/>
+            <a:ext cx="1508760" cy="1417320"/>
           </a:xfrm>
           <a:prstGeom prst="roundRect">
             <a:avLst/>
@@ -17369,7 +17369,7 @@
               </a:spcAft>
             </a:pPr>
             <a:r>
-              <a:rPr sz="900" b="0">
+              <a:rPr sz="800" b="0">
                 <a:solidFill>
                   <a:srgbClr val="FFFFFF"/>
                 </a:solidFill>
@@ -17388,7 +17388,7 @@
               </a:spcAft>
             </a:pPr>
             <a:r>
-              <a:rPr sz="900" b="0">
+              <a:rPr sz="800" b="0">
                 <a:solidFill>
                   <a:srgbClr val="FFFFFF"/>
                 </a:solidFill>
@@ -17407,7 +17407,7 @@
               </a:spcAft>
             </a:pPr>
             <a:r>
-              <a:rPr sz="900" b="0">
+              <a:rPr sz="800" b="0">
                 <a:solidFill>
                   <a:srgbClr val="FFFFFF"/>
                 </a:solidFill>
@@ -17426,7 +17426,7 @@
               </a:spcAft>
             </a:pPr>
             <a:r>
-              <a:rPr sz="900" b="0">
+              <a:rPr sz="800" b="0">
                 <a:solidFill>
                   <a:srgbClr val="FFFFFF"/>
                 </a:solidFill>
@@ -17445,7 +17445,7 @@
               </a:spcAft>
             </a:pPr>
             <a:r>
-              <a:rPr sz="900" b="0">
+              <a:rPr sz="800" b="0">
                 <a:solidFill>
                   <a:srgbClr val="FFFFFF"/>
                 </a:solidFill>
@@ -17464,8 +17464,8 @@
         </p:nvSpPr>
         <p:spPr>
           <a:xfrm>
-            <a:off x="2267712" y="4251960"/>
-            <a:ext cx="1719072" cy="1508760"/>
+            <a:off x="274320" y="4160520"/>
+            <a:ext cx="1508760" cy="1417320"/>
           </a:xfrm>
           <a:prstGeom prst="roundRect">
             <a:avLst/>
@@ -17504,7 +17504,7 @@
               </a:spcAft>
             </a:pPr>
             <a:r>
-              <a:rPr sz="900" b="0">
+              <a:rPr sz="800" b="0">
                 <a:solidFill>
                   <a:srgbClr val="FFFFFF"/>
                 </a:solidFill>
@@ -17523,7 +17523,7 @@
               </a:spcAft>
             </a:pPr>
             <a:r>
-              <a:rPr sz="900" b="0">
+              <a:rPr sz="800" b="0">
                 <a:solidFill>
                   <a:srgbClr val="FFFFFF"/>
                 </a:solidFill>
@@ -17542,7 +17542,7 @@
               </a:spcAft>
             </a:pPr>
             <a:r>
-              <a:rPr sz="900" b="0">
+              <a:rPr sz="800" b="0">
                 <a:solidFill>
                   <a:srgbClr val="FFFFFF"/>
                 </a:solidFill>
@@ -17561,7 +17561,7 @@
               </a:spcAft>
             </a:pPr>
             <a:r>
-              <a:rPr sz="900" b="0">
+              <a:rPr sz="800" b="0">
                 <a:solidFill>
                   <a:srgbClr val="FFFFFF"/>
                 </a:solidFill>
@@ -17580,7 +17580,7 @@
               </a:spcAft>
             </a:pPr>
             <a:r>
-              <a:rPr sz="900" b="0">
+              <a:rPr sz="800" b="0">
                 <a:solidFill>
                   <a:srgbClr val="FFFFFF"/>
                 </a:solidFill>
@@ -17599,8 +17599,8 @@
         </p:nvSpPr>
         <p:spPr>
           <a:xfrm>
-            <a:off x="4169664" y="4251960"/>
-            <a:ext cx="1719072" cy="1508760"/>
+            <a:off x="1938528" y="4160520"/>
+            <a:ext cx="1508760" cy="1417320"/>
           </a:xfrm>
           <a:prstGeom prst="roundRect">
             <a:avLst/>
@@ -17639,7 +17639,7 @@
               </a:spcAft>
             </a:pPr>
             <a:r>
-              <a:rPr sz="900" b="0">
+              <a:rPr sz="800" b="0">
                 <a:solidFill>
                   <a:srgbClr val="FFFFFF"/>
                 </a:solidFill>
@@ -17658,7 +17658,7 @@
               </a:spcAft>
             </a:pPr>
             <a:r>
-              <a:rPr sz="900" b="0">
+              <a:rPr sz="800" b="0">
                 <a:solidFill>
                   <a:srgbClr val="FFFFFF"/>
                 </a:solidFill>
@@ -17677,7 +17677,7 @@
               </a:spcAft>
             </a:pPr>
             <a:r>
-              <a:rPr sz="900" b="0">
+              <a:rPr sz="800" b="0">
                 <a:solidFill>
                   <a:srgbClr val="FFFFFF"/>
                 </a:solidFill>
@@ -17696,7 +17696,7 @@
               </a:spcAft>
             </a:pPr>
             <a:r>
-              <a:rPr sz="900" b="0">
+              <a:rPr sz="800" b="0">
                 <a:solidFill>
                   <a:srgbClr val="FFFFFF"/>
                 </a:solidFill>
@@ -17715,7 +17715,7 @@
               </a:spcAft>
             </a:pPr>
             <a:r>
-              <a:rPr sz="900" b="0">
+              <a:rPr sz="800" b="0">
                 <a:solidFill>
                   <a:srgbClr val="FFFFFF"/>
                 </a:solidFill>
@@ -17734,8 +17734,8 @@
         </p:nvSpPr>
         <p:spPr>
           <a:xfrm>
-            <a:off x="6071616" y="4251960"/>
-            <a:ext cx="1719072" cy="1508760"/>
+            <a:off x="3602736" y="4160520"/>
+            <a:ext cx="1508760" cy="1417320"/>
           </a:xfrm>
           <a:prstGeom prst="roundRect">
             <a:avLst/>
@@ -17774,7 +17774,7 @@
               </a:spcAft>
             </a:pPr>
             <a:r>
-              <a:rPr sz="900" b="0">
+              <a:rPr sz="800" b="0">
                 <a:solidFill>
                   <a:srgbClr val="FFFFFF"/>
                 </a:solidFill>
@@ -17793,7 +17793,7 @@
               </a:spcAft>
             </a:pPr>
             <a:r>
-              <a:rPr sz="900" b="0">
+              <a:rPr sz="800" b="0">
                 <a:solidFill>
                   <a:srgbClr val="FFFFFF"/>
                 </a:solidFill>
@@ -17812,7 +17812,7 @@
               </a:spcAft>
             </a:pPr>
             <a:r>
-              <a:rPr sz="900" b="0">
+              <a:rPr sz="800" b="0">
                 <a:solidFill>
                   <a:srgbClr val="FFFFFF"/>
                 </a:solidFill>
@@ -17831,7 +17831,7 @@
               </a:spcAft>
             </a:pPr>
             <a:r>
-              <a:rPr sz="900" b="0">
+              <a:rPr sz="800" b="0">
                 <a:solidFill>
                   <a:srgbClr val="FFFFFF"/>
                 </a:solidFill>
@@ -17850,7 +17850,7 @@
               </a:spcAft>
             </a:pPr>
             <a:r>
-              <a:rPr sz="900" b="0">
+              <a:rPr sz="800" b="0">
                 <a:solidFill>
                   <a:srgbClr val="FFFFFF"/>
                 </a:solidFill>
@@ -17869,8 +17869,8 @@
         </p:nvSpPr>
         <p:spPr>
           <a:xfrm>
-            <a:off x="7973568" y="4251960"/>
-            <a:ext cx="1719072" cy="1508760"/>
+            <a:off x="5266944" y="4160520"/>
+            <a:ext cx="1508760" cy="1417320"/>
           </a:xfrm>
           <a:prstGeom prst="roundRect">
             <a:avLst/>
@@ -17909,7 +17909,7 @@
               </a:spcAft>
             </a:pPr>
             <a:r>
-              <a:rPr sz="900" b="0">
+              <a:rPr sz="800" b="0">
                 <a:solidFill>
                   <a:srgbClr val="FFFFFF"/>
                 </a:solidFill>
@@ -17928,7 +17928,7 @@
               </a:spcAft>
             </a:pPr>
             <a:r>
-              <a:rPr sz="900" b="0">
+              <a:rPr sz="800" b="0">
                 <a:solidFill>
                   <a:srgbClr val="FFFFFF"/>
                 </a:solidFill>
@@ -17947,7 +17947,7 @@
               </a:spcAft>
             </a:pPr>
             <a:r>
-              <a:rPr sz="900" b="0">
+              <a:rPr sz="800" b="0">
                 <a:solidFill>
                   <a:srgbClr val="FFFFFF"/>
                 </a:solidFill>
@@ -17966,7 +17966,7 @@
               </a:spcAft>
             </a:pPr>
             <a:r>
-              <a:rPr sz="900" b="0">
+              <a:rPr sz="800" b="0">
                 <a:solidFill>
                   <a:srgbClr val="FFFFFF"/>
                 </a:solidFill>
@@ -17985,7 +17985,7 @@
               </a:spcAft>
             </a:pPr>
             <a:r>
-              <a:rPr sz="900" b="0">
+              <a:rPr sz="800" b="0">
                 <a:solidFill>
                   <a:srgbClr val="FFFFFF"/>
                 </a:solidFill>
@@ -18004,8 +18004,8 @@
         </p:nvSpPr>
         <p:spPr>
           <a:xfrm>
-            <a:off x="9875520" y="4251960"/>
-            <a:ext cx="1719072" cy="1508760"/>
+            <a:off x="6931152" y="4160520"/>
+            <a:ext cx="1508760" cy="1417320"/>
           </a:xfrm>
           <a:prstGeom prst="roundRect">
             <a:avLst/>
@@ -18044,7 +18044,7 @@
               </a:spcAft>
             </a:pPr>
             <a:r>
-              <a:rPr sz="900" b="0">
+              <a:rPr sz="800" b="0">
                 <a:solidFill>
                   <a:srgbClr val="FFFFFF"/>
                 </a:solidFill>
@@ -18063,7 +18063,142 @@
               </a:spcAft>
             </a:pPr>
             <a:r>
-              <a:rPr sz="900" b="0">
+              <a:rPr sz="800" b="0">
+                <a:solidFill>
+                  <a:srgbClr val="FFFFFF"/>
+                </a:solidFill>
+                <a:latin typeface="Arial"/>
+              </a:rPr>
+              <a:t>v2.4.0.0</a:t>
+            </a:r>
+          </a:p>
+          <a:p>
+            <a:pPr algn="ctr">
+              <a:spcBef>
+                <a:spcPts val="200"/>
+              </a:spcBef>
+              <a:spcAft>
+                <a:spcPts val="200"/>
+              </a:spcAft>
+            </a:pPr>
+            <a:r>
+              <a:rPr sz="800" b="0">
+                <a:solidFill>
+                  <a:srgbClr val="FFFFFF"/>
+                </a:solidFill>
+                <a:latin typeface="Arial"/>
+              </a:rPr>
+              <a:t/>
+            </a:r>
+          </a:p>
+          <a:p>
+            <a:pPr algn="ctr">
+              <a:spcBef>
+                <a:spcPts val="200"/>
+              </a:spcBef>
+              <a:spcAft>
+                <a:spcPts val="200"/>
+              </a:spcAft>
+            </a:pPr>
+            <a:r>
+              <a:rPr sz="800" b="0">
+                <a:solidFill>
+                  <a:srgbClr val="FFFFFF"/>
+                </a:solidFill>
+                <a:latin typeface="Arial"/>
+              </a:rPr>
+              <a:t>Federation</a:t>
+            </a:r>
+          </a:p>
+          <a:p>
+            <a:pPr algn="ctr">
+              <a:spcBef>
+                <a:spcPts val="200"/>
+              </a:spcBef>
+              <a:spcAft>
+                <a:spcPts val="200"/>
+              </a:spcAft>
+            </a:pPr>
+            <a:r>
+              <a:rPr sz="800" b="0">
+                <a:solidFill>
+                  <a:srgbClr val="FFFFFF"/>
+                </a:solidFill>
+                <a:latin typeface="Arial"/>
+              </a:rPr>
+              <a:t>Feb 2027</a:t>
+            </a:r>
+          </a:p>
+        </p:txBody>
+      </p:sp>
+      <p:sp>
+        <p:nvSpPr>
+          <p:cNvPr id="26" name="Rounded Rectangle 25"/>
+          <p:cNvSpPr/>
+          <p:nvPr/>
+        </p:nvSpPr>
+        <p:spPr>
+          <a:xfrm>
+            <a:off x="8595360" y="4160520"/>
+            <a:ext cx="1508760" cy="1417320"/>
+          </a:xfrm>
+          <a:prstGeom prst="roundRect">
+            <a:avLst/>
+          </a:prstGeom>
+          <a:solidFill>
+            <a:srgbClr val="1976D2"/>
+          </a:solidFill>
+          <a:ln>
+            <a:noFill/>
+          </a:ln>
+        </p:spPr>
+        <p:style>
+          <a:lnRef idx="1">
+            <a:schemeClr val="accent1"/>
+          </a:lnRef>
+          <a:fillRef idx="3">
+            <a:schemeClr val="accent1"/>
+          </a:fillRef>
+          <a:effectRef idx="2">
+            <a:schemeClr val="accent1"/>
+          </a:effectRef>
+          <a:fontRef idx="minor">
+            <a:schemeClr val="lt1"/>
+          </a:fontRef>
+        </p:style>
+        <p:txBody>
+          <a:bodyPr rtlCol="0" anchor="ctr" wrap="square"/>
+          <a:lstStyle/>
+          <a:p>
+            <a:pPr algn="ctr">
+              <a:spcBef>
+                <a:spcPts val="200"/>
+              </a:spcBef>
+              <a:spcAft>
+                <a:spcPts val="200"/>
+              </a:spcAft>
+            </a:pPr>
+            <a:r>
+              <a:rPr sz="800" b="0">
+                <a:solidFill>
+                  <a:srgbClr val="FFFFFF"/>
+                </a:solidFill>
+                <a:latin typeface="Arial"/>
+              </a:rPr>
+              <a:t>Phase 13</a:t>
+            </a:r>
+          </a:p>
+          <a:p>
+            <a:pPr algn="ctr">
+              <a:spcBef>
+                <a:spcPts val="200"/>
+              </a:spcBef>
+              <a:spcAft>
+                <a:spcPts val="200"/>
+              </a:spcAft>
+            </a:pPr>
+            <a:r>
+              <a:rPr sz="800" b="0">
                 <a:solidFill>
                   <a:srgbClr val="FFFFFF"/>
                 </a:solidFill>
@@ -18082,7 +18217,7 @@
               </a:spcAft>
             </a:pPr>
             <a:r>
-              <a:rPr sz="900" b="0">
+              <a:rPr sz="800" b="0">
                 <a:solidFill>
                   <a:srgbClr val="FFFFFF"/>
                 </a:solidFill>
@@ -18101,7 +18236,7 @@
               </a:spcAft>
             </a:pPr>
             <a:r>
-              <a:rPr sz="900" b="0">
+              <a:rPr sz="800" b="0">
                 <a:solidFill>
                   <a:srgbClr val="FFFFFF"/>
                 </a:solidFill>
@@ -18120,20 +18255,20 @@
               </a:spcAft>
             </a:pPr>
             <a:r>
-              <a:rPr sz="900" b="0">
-                <a:solidFill>
-                  <a:srgbClr val="FFFFFF"/>
-                </a:solidFill>
-                <a:latin typeface="Arial"/>
-              </a:rPr>
-              <a:t>Feb 2027</a:t>
-            </a:r>
-          </a:p>
-        </p:txBody>
-      </p:sp>
-      <p:sp>
-        <p:nvSpPr>
-          <p:cNvPr id="26" name="TextBox 25"/>
+              <a:rPr sz="800" b="0">
+                <a:solidFill>
+                  <a:srgbClr val="FFFFFF"/>
+                </a:solidFill>
+                <a:latin typeface="Arial"/>
+              </a:rPr>
+              <a:t>Mar 2027</a:t>
+            </a:r>
+          </a:p>
+        </p:txBody>
+      </p:sp>
+      <p:sp>
+        <p:nvSpPr>
+          <p:cNvPr id="27" name="TextBox 26"/>
           <p:cNvSpPr txBox="1"/>
           <p:nvPr/>
         </p:nvSpPr>
@@ -19566,7 +19701,7 @@
                 </a:solidFill>
                 <a:latin typeface="Arial"/>
               </a:rPr>
-              <a:t>Futures: Long-Term (Phases 10–12)</a:t>
+              <a:t>Futures: Long-Term (Phases 10–13)</a:t>
             </a:r>
           </a:p>
         </p:txBody>
@@ -19660,7 +19795,7 @@
         </p:nvGraphicFramePr>
         <p:xfrm>
           <a:off x="731520" y="1371600"/>
-          <a:ext cx="9601200" cy="1463040"/>
+          <a:ext cx="9601200" cy="1828800"/>
         </p:xfrm>
         <a:graphic>
           <a:graphicData uri="http://schemas.openxmlformats.org/drawingml/2006/table">
@@ -20007,7 +20142,7 @@
                         </a:defRPr>
                       </a:pPr>
                       <a:r>
-                        <a:t>v3.0.0.0</a:t>
+                        <a:t>v2.4.0.0</a:t>
                       </a:r>
                     </a:p>
                   </a:txBody>
@@ -20031,7 +20166,7 @@
                         </a:defRPr>
                       </a:pPr>
                       <a:r>
-                        <a:t>Enterprise GA</a:t>
+                        <a:t>Multi-Site Federation</a:t>
                       </a:r>
                     </a:p>
                   </a:txBody>
@@ -20062,6 +20197,104 @@
                   <a:tcPr>
                     <a:solidFill>
                       <a:srgbClr val="FFFFFF"/>
+                    </a:solidFill>
+                  </a:tcPr>
+                </a:tc>
+              </a:tr>
+              <a:tr h="365760">
+                <a:tc>
+                  <a:txBody>
+                    <a:bodyPr/>
+                    <a:lstStyle/>
+                    <a:p>
+                      <a:pPr>
+                        <a:defRPr sz="1300">
+                          <a:solidFill>
+                            <a:srgbClr val="1A2332"/>
+                          </a:solidFill>
+                          <a:latin typeface="Arial"/>
+                        </a:defRPr>
+                      </a:pPr>
+                      <a:r>
+                        <a:t>13</a:t>
+                      </a:r>
+                    </a:p>
+                  </a:txBody>
+                  <a:tcPr>
+                    <a:solidFill>
+                      <a:srgbClr val="E3F2FD"/>
+                    </a:solidFill>
+                  </a:tcPr>
+                </a:tc>
+                <a:tc>
+                  <a:txBody>
+                    <a:bodyPr/>
+                    <a:lstStyle/>
+                    <a:p>
+                      <a:pPr>
+                        <a:defRPr sz="1300">
+                          <a:solidFill>
+                            <a:srgbClr val="1A2332"/>
+                          </a:solidFill>
+                          <a:latin typeface="Arial"/>
+                        </a:defRPr>
+                      </a:pPr>
+                      <a:r>
+                        <a:t>v3.0.0.0</a:t>
+                      </a:r>
+                    </a:p>
+                  </a:txBody>
+                  <a:tcPr>
+                    <a:solidFill>
+                      <a:srgbClr val="E3F2FD"/>
+                    </a:solidFill>
+                  </a:tcPr>
+                </a:tc>
+                <a:tc>
+                  <a:txBody>
+                    <a:bodyPr/>
+                    <a:lstStyle/>
+                    <a:p>
+                      <a:pPr>
+                        <a:defRPr sz="1300">
+                          <a:solidFill>
+                            <a:srgbClr val="1A2332"/>
+                          </a:solidFill>
+                          <a:latin typeface="Arial"/>
+                        </a:defRPr>
+                      </a:pPr>
+                      <a:r>
+                        <a:t>Enterprise GA</a:t>
+                      </a:r>
+                    </a:p>
+                  </a:txBody>
+                  <a:tcPr>
+                    <a:solidFill>
+                      <a:srgbClr val="E3F2FD"/>
+                    </a:solidFill>
+                  </a:tcPr>
+                </a:tc>
+                <a:tc>
+                  <a:txBody>
+                    <a:bodyPr/>
+                    <a:lstStyle/>
+                    <a:p>
+                      <a:pPr>
+                        <a:defRPr sz="1300">
+                          <a:solidFill>
+                            <a:srgbClr val="1A2332"/>
+                          </a:solidFill>
+                          <a:latin typeface="Arial"/>
+                        </a:defRPr>
+                      </a:pPr>
+                      <a:r>
+                        <a:t>Mar 2027</a:t>
+                      </a:r>
+                    </a:p>
+                  </a:txBody>
+                  <a:tcPr>
+                    <a:solidFill>
+                      <a:srgbClr val="E3F2FD"/>
                     </a:solidFill>
                   </a:tcPr>
                 </a:tc>

</xml_diff>